<commit_message>
Added matlab optimization slide.
</commit_message>
<xml_diff>
--- a/Additional Files/Presentation The Mushrooms.pptx
+++ b/Additional Files/Presentation The Mushrooms.pptx
@@ -4433,28 +4433,82 @@
           </a:p>
         </p:txBody>
       </p:sp>
-      <p:sp>
-        <p:nvSpPr>
-          <p:cNvPr id="3" name="Content Placeholder 2">
-            <a:extLst>
-              <a:ext uri="{FF2B5EF4-FFF2-40B4-BE49-F238E27FC236}">
-                <a16:creationId xmlns:a16="http://schemas.microsoft.com/office/drawing/2014/main" id="{BB29DC87-835E-4B47-98E2-52C91343B73E}"/>
-              </a:ext>
-            </a:extLst>
-          </p:cNvPr>
-          <p:cNvSpPr>
-            <a:spLocks noGrp="1"/>
-          </p:cNvSpPr>
-          <p:nvPr>
-            <p:ph idx="1"/>
-          </p:nvPr>
-        </p:nvSpPr>
-        <p:spPr/>
-        <p:txBody>
-          <a:bodyPr/>
-          <a:lstStyle/>
-          <a:p>
-            <a:endParaRPr lang="en-US"/>
+      <p:pic>
+        <p:nvPicPr>
+          <p:cNvPr id="9" name="Content Placeholder 8">
+            <a:extLst>
+              <a:ext uri="{FF2B5EF4-FFF2-40B4-BE49-F238E27FC236}">
+                <a16:creationId xmlns:a16="http://schemas.microsoft.com/office/drawing/2014/main" id="{1E67B803-5B05-834C-A2DB-4F8448E50C17}"/>
+              </a:ext>
+            </a:extLst>
+          </p:cNvPr>
+          <p:cNvPicPr>
+            <a:picLocks noGrp="1" noChangeAspect="1"/>
+          </p:cNvPicPr>
+          <p:nvPr>
+            <p:ph sz="half" idx="1"/>
+          </p:nvPr>
+        </p:nvPicPr>
+        <p:blipFill>
+          <a:blip r:embed="rId2"/>
+          <a:stretch>
+            <a:fillRect/>
+          </a:stretch>
+        </p:blipFill>
+        <p:spPr>
+          <a:xfrm>
+            <a:off x="838200" y="2058194"/>
+            <a:ext cx="5181600" cy="3886200"/>
+          </a:xfrm>
+        </p:spPr>
+      </p:pic>
+      <p:sp>
+        <p:nvSpPr>
+          <p:cNvPr id="7" name="Content Placeholder 6">
+            <a:extLst>
+              <a:ext uri="{FF2B5EF4-FFF2-40B4-BE49-F238E27FC236}">
+                <a16:creationId xmlns:a16="http://schemas.microsoft.com/office/drawing/2014/main" id="{B63E7B17-DAE9-C446-827C-18F994159655}"/>
+              </a:ext>
+            </a:extLst>
+          </p:cNvPr>
+          <p:cNvSpPr>
+            <a:spLocks noGrp="1"/>
+          </p:cNvSpPr>
+          <p:nvPr>
+            <p:ph sz="half" idx="2"/>
+          </p:nvPr>
+        </p:nvSpPr>
+        <p:spPr/>
+        <p:txBody>
+          <a:bodyPr/>
+          <a:lstStyle/>
+          <a:p>
+            <a:r>
+              <a:rPr lang="en-US" dirty="0" err="1"/>
+              <a:t>Matlab</a:t>
+            </a:r>
+            <a:r>
+              <a:rPr lang="en-US" dirty="0"/>
+              <a:t> simulation for weighing/penalty function for deciding whether to pick up or drop of pedestrians</a:t>
+            </a:r>
+          </a:p>
+          <a:p>
+            <a:r>
+              <a:rPr lang="en-US" dirty="0"/>
+              <a:t>Preference for leaning to pick up/off-load pedestrians</a:t>
+            </a:r>
+          </a:p>
+          <a:p>
+            <a:r>
+              <a:rPr lang="en-US" dirty="0"/>
+              <a:t>Distance: Lower is better (left side is preferable over right side)</a:t>
+            </a:r>
+          </a:p>
+          <a:p>
+            <a:r>
+              <a:rPr lang="en-US" dirty="0"/>
+              <a:t>Not implemented</a:t>
+            </a:r>
           </a:p>
         </p:txBody>
       </p:sp>

</xml_diff>